<commit_message>
Finished the slides, and all the starter code.
</commit_message>
<xml_diff>
--- a/exercises/cisc-813/htn/slides.pptx
+++ b/exercises/cisc-813/htn/slides.pptx
@@ -20,8 +20,7 @@
     <p:sldId id="1697" r:id="rId14"/>
     <p:sldId id="1703" r:id="rId15"/>
     <p:sldId id="1698" r:id="rId16"/>
-    <p:sldId id="1704" r:id="rId17"/>
-    <p:sldId id="1684" r:id="rId18"/>
+    <p:sldId id="1684" r:id="rId17"/>
   </p:sldIdLst>
   <p:sldSz cx="12192000" cy="6858000"/>
   <p:notesSz cx="6858000" cy="9144000"/>
@@ -694,7 +693,7 @@
           <a:p>
             <a:fld id="{D6D0F569-AC90-44EB-9EF4-4E5C2F5D823C}" type="datetime1">
               <a:rPr lang="en-US" smtClean="0"/>
-              <a:t>10/27/2024</a:t>
+              <a:t>11/5/2024</a:t>
             </a:fld>
             <a:endParaRPr lang="en-US" dirty="0"/>
           </a:p>
@@ -1373,7 +1372,7 @@
           <a:p>
             <a:fld id="{46BA7D41-E8B7-4A0B-B861-3EC4AE88917D}" type="datetime1">
               <a:rPr lang="en-US" smtClean="0"/>
-              <a:t>10/27/2024</a:t>
+              <a:t>11/5/2024</a:t>
             </a:fld>
             <a:endParaRPr lang="en-US" dirty="0"/>
           </a:p>
@@ -2062,7 +2061,7 @@
           <a:p>
             <a:fld id="{A7C34823-0B19-4B4E-A643-7A3B0A3D24D6}" type="datetime1">
               <a:rPr lang="en-US" smtClean="0"/>
-              <a:t>10/27/2024</a:t>
+              <a:t>11/5/2024</a:t>
             </a:fld>
             <a:endParaRPr lang="en-US" dirty="0"/>
           </a:p>
@@ -3185,7 +3184,7 @@
           <a:p>
             <a:fld id="{8C2D79EF-17C8-45D8-9866-DAF5723FC604}" type="datetime1">
               <a:rPr lang="en-US" smtClean="0"/>
-              <a:t>10/27/2024</a:t>
+              <a:t>11/5/2024</a:t>
             </a:fld>
             <a:endParaRPr lang="en-US" dirty="0"/>
           </a:p>
@@ -3940,7 +3939,7 @@
           <a:p>
             <a:fld id="{DFFC2ADC-3680-4013-A757-E4663495DB98}" type="datetime1">
               <a:rPr lang="en-US" smtClean="0"/>
-              <a:t>10/27/2024</a:t>
+              <a:t>11/5/2024</a:t>
             </a:fld>
             <a:endParaRPr lang="en-US" dirty="0"/>
           </a:p>
@@ -4687,7 +4686,7 @@
           <a:p>
             <a:fld id="{4751BA94-5DCA-4F19-960F-0FB2BD5EE85A}" type="datetime1">
               <a:rPr lang="en-US" smtClean="0"/>
-              <a:t>10/27/2024</a:t>
+              <a:t>11/5/2024</a:t>
             </a:fld>
             <a:endParaRPr lang="en-US" dirty="0"/>
           </a:p>
@@ -5581,7 +5580,7 @@
           <a:p>
             <a:fld id="{01BED947-38D9-44AC-8B89-E79758333B77}" type="datetime1">
               <a:rPr lang="en-US" smtClean="0"/>
-              <a:t>10/27/2024</a:t>
+              <a:t>11/5/2024</a:t>
             </a:fld>
             <a:endParaRPr lang="en-US" dirty="0"/>
           </a:p>
@@ -6202,7 +6201,7 @@
           <a:p>
             <a:fld id="{3781E23F-BD3C-4F23-B116-2B758120C8AC}" type="datetime1">
               <a:rPr lang="en-US" smtClean="0"/>
-              <a:t>10/27/2024</a:t>
+              <a:t>11/5/2024</a:t>
             </a:fld>
             <a:endParaRPr lang="en-US" dirty="0"/>
           </a:p>
@@ -6794,7 +6793,7 @@
           <a:p>
             <a:fld id="{473CFAA9-6D59-4D98-869E-ACBDB83B2CA4}" type="datetime1">
               <a:rPr lang="en-US" smtClean="0"/>
-              <a:t>10/27/2024</a:t>
+              <a:t>11/5/2024</a:t>
             </a:fld>
             <a:endParaRPr lang="en-US"/>
           </a:p>
@@ -7586,7 +7585,7 @@
           <a:p>
             <a:fld id="{DC410804-27E3-430A-BB42-B831260DE39A}" type="datetime1">
               <a:rPr lang="en-US" smtClean="0"/>
-              <a:t>10/27/2024</a:t>
+              <a:t>11/5/2024</a:t>
             </a:fld>
             <a:endParaRPr lang="en-US" dirty="0"/>
           </a:p>
@@ -8357,7 +8356,7 @@
           <a:p>
             <a:fld id="{60E22DE3-3D1A-4D53-B9A6-6C7463B8C992}" type="datetime1">
               <a:rPr lang="en-US" smtClean="0"/>
-              <a:t>10/27/2024</a:t>
+              <a:t>11/5/2024</a:t>
             </a:fld>
             <a:endParaRPr lang="en-US" dirty="0"/>
           </a:p>
@@ -8668,7 +8667,7 @@
             <a:fld id="{5ECD8B30-1B71-45A1-8314-D59C86F581E1}" type="datetime1">
               <a:rPr lang="en-US" smtClean="0"/>
               <a:pPr/>
-              <a:t>10/27/2024</a:t>
+              <a:t>11/5/2024</a:t>
             </a:fld>
             <a:endParaRPr lang="en-US" b="1" dirty="0"/>
           </a:p>
@@ -9223,8 +9222,12 @@
               <a:buNone/>
             </a:pPr>
             <a:r>
+              <a:rPr lang="en-CA" sz="2800" dirty="0" err="1"/>
+              <a:t>htn</a:t>
+            </a:r>
+            <a:r>
               <a:rPr lang="en-CA" sz="2800" dirty="0"/>
-              <a:t>hybrid  /  loopy</a:t>
+              <a:t>  /  yummy</a:t>
             </a:r>
           </a:p>
         </p:txBody>
@@ -9294,7 +9297,7 @@
           <a:p>
             <a:r>
               <a:rPr lang="en-CA" dirty="0"/>
-              <a:t>3. Start, stop, crash!</a:t>
+              <a:t>3. Service &amp; Hands</a:t>
             </a:r>
           </a:p>
         </p:txBody>
@@ -9315,98 +9318,139 @@
             <p:ph idx="1"/>
           </p:nvPr>
         </p:nvSpPr>
-        <p:spPr/>
+        <p:spPr>
+          <a:xfrm>
+            <a:off x="838200" y="1825625"/>
+            <a:ext cx="10703560" cy="4351338"/>
+          </a:xfrm>
+        </p:spPr>
         <p:txBody>
-          <a:bodyPr/>
+          <a:bodyPr>
+            <a:normAutofit fontScale="85000" lnSpcReduction="10000"/>
+          </a:bodyPr>
           <a:lstStyle/>
           <a:p>
+            <a:pPr marL="0" indent="0">
+              <a:buNone/>
+            </a:pPr>
             <a:r>
               <a:rPr lang="en-CA" dirty="0"/>
-              <a:t>Add a crash </a:t>
-            </a:r>
-            <a:r>
-              <a:rPr lang="en-CA" b="1" dirty="0">
+              <a:t>Let’s forget about the ingredients for a moment and figure out how to get the</a:t>
+            </a:r>
+            <a:br>
+              <a:rPr lang="en-CA" dirty="0"/>
+            </a:br>
+            <a:r>
+              <a:rPr lang="en-CA" dirty="0"/>
+              <a:t>food to our customers. Meals are insta-prep, and movement is challenging.</a:t>
+            </a:r>
+          </a:p>
+          <a:p>
+            <a:pPr marL="0" indent="0">
+              <a:buNone/>
+            </a:pPr>
+            <a:endParaRPr lang="en-CA" dirty="0"/>
+          </a:p>
+          <a:p>
+            <a:r>
+              <a:rPr lang="en-CA" dirty="0"/>
+              <a:t>Take note of the actions (primitive tasks) available to you</a:t>
+            </a:r>
+          </a:p>
+          <a:p>
+            <a:r>
+              <a:rPr lang="en-CA" dirty="0"/>
+              <a:t>Check out the </a:t>
+            </a:r>
+            <a:r>
+              <a:rPr lang="en-US" b="0" dirty="0" err="1">
                 <a:solidFill>
-                  <a:schemeClr val="accent1"/>
+                  <a:schemeClr val="accent6">
+                    <a:lumMod val="60000"/>
+                    <a:lumOff val="40000"/>
+                  </a:schemeClr>
                 </a:solidFill>
               </a:rPr>
-              <a:t>event</a:t>
-            </a:r>
-            <a:r>
-              <a:rPr lang="en-CA" dirty="0"/>
-              <a:t> that will smash the two </a:t>
-            </a:r>
-            <a:r>
-              <a:rPr lang="en-CA" dirty="0">
+              <a:t>m_handle</a:t>
+            </a:r>
+            <a:r>
+              <a:rPr lang="en-US" b="0" dirty="0">
                 <a:solidFill>
-                  <a:schemeClr val="accent3"/>
+                  <a:schemeClr val="accent6">
+                    <a:lumMod val="60000"/>
+                    <a:lumOff val="40000"/>
+                  </a:schemeClr>
                 </a:solidFill>
               </a:rPr>
-              <a:t>shuttles</a:t>
+              <a:t>-order </a:t>
             </a:r>
             <a:r>
               <a:rPr lang="en-CA" dirty="0"/>
-              <a:t> together.</a:t>
+              <a:t>method (mix of primitive/complex subtasks)</a:t>
             </a:r>
           </a:p>
           <a:p>
             <a:r>
               <a:rPr lang="en-CA" dirty="0"/>
-              <a:t>To make sure it works, let’s set the goal to include </a:t>
-            </a:r>
-            <a:r>
-              <a:rPr lang="en-CA" dirty="0">
+              <a:t>Implement the </a:t>
+            </a:r>
+            <a:r>
+              <a:rPr lang="en-US" b="0" dirty="0" err="1">
                 <a:solidFill>
-                  <a:schemeClr val="accent2"/>
+                  <a:schemeClr val="accent6">
+                    <a:lumMod val="60000"/>
+                    <a:lumOff val="40000"/>
+                  </a:schemeClr>
                 </a:solidFill>
               </a:rPr>
-              <a:t>crash</a:t>
-            </a:r>
-            <a:r>
-              <a:rPr lang="en-CA" dirty="0"/>
-              <a:t>ing</a:t>
-            </a:r>
-          </a:p>
-          <a:p>
-            <a:r>
-              <a:rPr lang="en-CA" dirty="0"/>
-              <a:t>To let the planner control things, have </a:t>
-            </a:r>
-            <a:r>
-              <a:rPr lang="en-CA" b="1" dirty="0">
+              <a:t>m_deliver</a:t>
+            </a:r>
+            <a:r>
+              <a:rPr lang="en-US" b="0" dirty="0">
                 <a:solidFill>
-                  <a:schemeClr val="accent4"/>
+                  <a:schemeClr val="accent6">
+                    <a:lumMod val="60000"/>
+                    <a:lumOff val="40000"/>
+                  </a:schemeClr>
                 </a:solidFill>
               </a:rPr>
-              <a:t>start-driving</a:t>
+              <a:t>-meal </a:t>
             </a:r>
             <a:r>
               <a:rPr lang="en-CA" dirty="0"/>
-              <a:t> and </a:t>
-            </a:r>
-            <a:r>
-              <a:rPr lang="en-CA" b="1" dirty="0">
+              <a:t>method that gets a meal delivered</a:t>
+            </a:r>
+          </a:p>
+          <a:p>
+            <a:r>
+              <a:rPr lang="en-CA" dirty="0"/>
+              <a:t>Implement the recursive </a:t>
+            </a:r>
+            <a:r>
+              <a:rPr lang="en-US" b="0" dirty="0" err="1">
                 <a:solidFill>
-                  <a:schemeClr val="accent4"/>
+                  <a:schemeClr val="accent6">
+                    <a:lumMod val="60000"/>
+                    <a:lumOff val="40000"/>
+                  </a:schemeClr>
                 </a:solidFill>
               </a:rPr>
-              <a:t>stop-driving</a:t>
-            </a:r>
-            <a:r>
-              <a:rPr lang="en-CA" dirty="0"/>
-              <a:t> actions that just change the </a:t>
-            </a:r>
-            <a:r>
-              <a:rPr lang="en-CA" dirty="0">
+              <a:t>m_goto</a:t>
+            </a:r>
+            <a:r>
+              <a:rPr lang="en-US" b="0" dirty="0">
                 <a:solidFill>
-                  <a:schemeClr val="accent2"/>
+                  <a:schemeClr val="accent6">
+                    <a:lumMod val="60000"/>
+                    <a:lumOff val="40000"/>
+                  </a:schemeClr>
                 </a:solidFill>
               </a:rPr>
-              <a:t>driving</a:t>
+              <a:t> </a:t>
             </a:r>
             <a:r>
               <a:rPr lang="en-CA" dirty="0"/>
-              <a:t> status</a:t>
+              <a:t>method that moves someone to a final location</a:t>
             </a:r>
           </a:p>
           <a:p>
@@ -9420,8 +9464,12 @@
               <a:buNone/>
             </a:pPr>
             <a:r>
+              <a:rPr lang="en-CA" sz="2800" dirty="0" err="1"/>
+              <a:t>htn</a:t>
+            </a:r>
+            <a:r>
               <a:rPr lang="en-CA" sz="2800" dirty="0"/>
-              <a:t>hybrid  /  crash</a:t>
+              <a:t>  /  hands</a:t>
             </a:r>
             <a:endParaRPr lang="en-CA" dirty="0"/>
           </a:p>
@@ -9494,12 +9542,16 @@
               <a:buNone/>
             </a:pPr>
             <a:r>
+              <a:rPr lang="en-CA" sz="2800" dirty="0" err="1"/>
+              <a:t>htn</a:t>
+            </a:r>
+            <a:r>
               <a:rPr lang="en-CA" sz="2800" dirty="0"/>
-              <a:t>hybrid  /  </a:t>
+              <a:t>  /  </a:t>
             </a:r>
             <a:r>
               <a:rPr lang="en-CA" sz="2800" dirty="0" err="1"/>
-              <a:t>kablooey</a:t>
+              <a:t>onyourleft</a:t>
             </a:r>
             <a:endParaRPr lang="en-CA" sz="2800" dirty="0"/>
           </a:p>
@@ -9574,7 +9626,7 @@
             </a:r>
             <a:r>
               <a:rPr lang="en-US" dirty="0"/>
-              <a:t>Rules of the road.</a:t>
+              <a:t>Order Up!</a:t>
             </a:r>
             <a:endParaRPr lang="en-CA" dirty="0"/>
           </a:p>
@@ -9596,9 +9648,16 @@
             <p:ph idx="1"/>
           </p:nvPr>
         </p:nvSpPr>
-        <p:spPr/>
+        <p:spPr>
+          <a:xfrm>
+            <a:off x="838200" y="1825624"/>
+            <a:ext cx="10515600" cy="4554855"/>
+          </a:xfrm>
+        </p:spPr>
         <p:txBody>
-          <a:bodyPr/>
+          <a:bodyPr>
+            <a:normAutofit lnSpcReduction="10000"/>
+          </a:bodyPr>
           <a:lstStyle/>
           <a:p>
             <a:pPr marL="0" indent="0">
@@ -9606,76 +9665,62 @@
             </a:pPr>
             <a:r>
               <a:rPr lang="en-CA" dirty="0"/>
-              <a:t>Let’s go back to letting the cars loose</a:t>
+              <a:t>Let’s go back to our arugula fennel salad…</a:t>
             </a:r>
           </a:p>
           <a:p>
             <a:r>
               <a:rPr lang="en-CA" dirty="0"/>
-              <a:t>Remove the </a:t>
-            </a:r>
-            <a:r>
-              <a:rPr lang="en-CA" dirty="0">
-                <a:solidFill>
-                  <a:schemeClr val="accent4"/>
-                </a:solidFill>
-              </a:rPr>
-              <a:t>start</a:t>
-            </a:r>
+              <a:t>Run the starting code, and notice how it just doesn’t budge</a:t>
+            </a:r>
+          </a:p>
+          <a:p>
             <a:r>
               <a:rPr lang="en-CA" dirty="0"/>
-              <a:t>/</a:t>
-            </a:r>
-            <a:r>
-              <a:rPr lang="en-CA" dirty="0">
-                <a:solidFill>
-                  <a:schemeClr val="accent4"/>
-                </a:solidFill>
-              </a:rPr>
-              <a:t>stop</a:t>
+              <a:t>Try </a:t>
+            </a:r>
+            <a:r>
+              <a:rPr lang="en-CA" dirty="0" err="1"/>
+              <a:t>prep’ing</a:t>
             </a:r>
             <a:r>
               <a:rPr lang="en-CA" dirty="0"/>
-              <a:t> actions</a:t>
+              <a:t> just the special or both meals, and see what happens</a:t>
             </a:r>
           </a:p>
           <a:p>
             <a:r>
               <a:rPr lang="en-CA" dirty="0"/>
-              <a:t>Add a </a:t>
-            </a:r>
-            <a:r>
-              <a:rPr lang="en-CA" b="1" dirty="0">
+              <a:t>Go manual with the salad ingredients:</a:t>
+            </a:r>
+          </a:p>
+          <a:p>
+            <a:pPr lvl="1"/>
+            <a:r>
+              <a:rPr lang="en-CA" dirty="0"/>
+              <a:t>Add a new </a:t>
+            </a:r>
+            <a:r>
+              <a:rPr lang="en-US" b="0" dirty="0">
                 <a:solidFill>
                   <a:schemeClr val="accent1"/>
                 </a:solidFill>
               </a:rPr>
-              <a:t>light-change</a:t>
+              <a:t>prepare-salad-ingredients </a:t>
             </a:r>
             <a:r>
               <a:rPr lang="en-CA" dirty="0"/>
-              <a:t> event that alternates which </a:t>
-            </a:r>
-            <a:r>
-              <a:rPr lang="en-CA" dirty="0">
-                <a:solidFill>
-                  <a:schemeClr val="accent3"/>
-                </a:solidFill>
-              </a:rPr>
-              <a:t>circuit</a:t>
-            </a:r>
+              <a:t>task</a:t>
+            </a:r>
+          </a:p>
+          <a:p>
+            <a:pPr lvl="1"/>
             <a:r>
               <a:rPr lang="en-CA" dirty="0"/>
-              <a:t> is going.</a:t>
-            </a:r>
-          </a:p>
-          <a:p>
-            <a:r>
-              <a:rPr lang="en-CA" dirty="0"/>
-              <a:t>Include a </a:t>
-            </a:r>
-            <a:r>
-              <a:rPr lang="en-CA" b="1" dirty="0">
+              <a:t>Change the</a:t>
+            </a:r>
+            <a:r>
+              <a:rPr lang="en-US" b="0" dirty="0">
                 <a:solidFill>
                   <a:schemeClr val="accent6">
                     <a:lumMod val="60000"/>
@@ -9683,17 +9728,96 @@
                   </a:schemeClr>
                 </a:solidFill>
               </a:rPr>
-              <a:t>light-timer</a:t>
+              <a:t> </a:t>
+            </a:r>
+            <a:r>
+              <a:rPr lang="en-US" b="0" dirty="0" err="1">
+                <a:solidFill>
+                  <a:schemeClr val="accent6">
+                    <a:lumMod val="60000"/>
+                    <a:lumOff val="40000"/>
+                  </a:schemeClr>
+                </a:solidFill>
+              </a:rPr>
+              <a:t>m_prepare</a:t>
+            </a:r>
+            <a:r>
+              <a:rPr lang="en-US" b="0" dirty="0">
+                <a:solidFill>
+                  <a:schemeClr val="accent6">
+                    <a:lumMod val="60000"/>
+                    <a:lumOff val="40000"/>
+                  </a:schemeClr>
+                </a:solidFill>
+              </a:rPr>
+              <a:t>-</a:t>
+            </a:r>
+            <a:r>
+              <a:rPr lang="en-US" dirty="0">
+                <a:solidFill>
+                  <a:schemeClr val="accent6">
+                    <a:lumMod val="60000"/>
+                    <a:lumOff val="40000"/>
+                  </a:schemeClr>
+                </a:solidFill>
+              </a:rPr>
+              <a:t>special-salad</a:t>
+            </a:r>
+            <a:r>
+              <a:rPr lang="en-US" b="0" dirty="0">
+                <a:solidFill>
+                  <a:schemeClr val="accent6">
+                    <a:lumMod val="60000"/>
+                    <a:lumOff val="40000"/>
+                  </a:schemeClr>
+                </a:solidFill>
+              </a:rPr>
+              <a:t> </a:t>
             </a:r>
             <a:r>
               <a:rPr lang="en-CA" dirty="0"/>
-              <a:t> process that counts down the red light.</a:t>
-            </a:r>
-          </a:p>
-          <a:p>
+              <a:t>method to use it</a:t>
+            </a:r>
+          </a:p>
+          <a:p>
+            <a:pPr lvl="1"/>
+            <a:r>
+              <a:rPr lang="en-CA" dirty="0"/>
+              <a:t>Add a new </a:t>
+            </a:r>
+            <a:r>
+              <a:rPr lang="en-US" b="0" dirty="0" err="1">
+                <a:solidFill>
+                  <a:schemeClr val="accent6">
+                    <a:lumMod val="60000"/>
+                    <a:lumOff val="40000"/>
+                  </a:schemeClr>
+                </a:solidFill>
+              </a:rPr>
+              <a:t>m_prepare</a:t>
+            </a:r>
+            <a:r>
+              <a:rPr lang="en-US" b="0" dirty="0">
+                <a:solidFill>
+                  <a:schemeClr val="accent6">
+                    <a:lumMod val="60000"/>
+                    <a:lumOff val="40000"/>
+                  </a:schemeClr>
+                </a:solidFill>
+              </a:rPr>
+              <a:t>-salad-ingredients </a:t>
+            </a:r>
+            <a:r>
+              <a:rPr lang="en-CA" dirty="0"/>
+              <a:t>method for the new task that prepares all of the necessary ingredients for the special (manually listed)</a:t>
+            </a:r>
+          </a:p>
+          <a:p>
+            <a:pPr lvl="1"/>
             <a:endParaRPr lang="en-CA" dirty="0"/>
           </a:p>
           <a:p>
+            <a:pPr lvl="1"/>
             <a:endParaRPr lang="en-CA" dirty="0"/>
           </a:p>
           <a:p>
@@ -9701,12 +9825,16 @@
               <a:buNone/>
             </a:pPr>
             <a:r>
+              <a:rPr lang="en-CA" sz="2800" dirty="0" err="1"/>
+              <a:t>htn</a:t>
+            </a:r>
+            <a:r>
               <a:rPr lang="en-CA" sz="2800" dirty="0"/>
-              <a:t>hybrid  /  </a:t>
+              <a:t>  /  </a:t>
             </a:r>
             <a:r>
               <a:rPr lang="en-CA" sz="2800" dirty="0" err="1"/>
-              <a:t>bythebook</a:t>
+              <a:t>preptime</a:t>
             </a:r>
             <a:endParaRPr lang="en-CA" dirty="0"/>
           </a:p>
@@ -9779,12 +9907,16 @@
               <a:buNone/>
             </a:pPr>
             <a:r>
+              <a:rPr lang="en-CA" sz="2800" dirty="0" err="1"/>
+              <a:t>htn</a:t>
+            </a:r>
+            <a:r>
               <a:rPr lang="en-CA" sz="2800" dirty="0"/>
-              <a:t>hybrid  /  </a:t>
+              <a:t>  /  </a:t>
             </a:r>
             <a:r>
               <a:rPr lang="en-CA" sz="2800" dirty="0" err="1"/>
-              <a:t>goonred</a:t>
+              <a:t>fastfood</a:t>
             </a:r>
             <a:endParaRPr lang="en-CA" sz="2800" dirty="0"/>
           </a:p>
@@ -9832,6 +9964,54 @@
           <a:chExt cx="0" cy="0"/>
         </a:xfrm>
       </p:grpSpPr>
+      <p:pic>
+        <p:nvPicPr>
+          <p:cNvPr id="3" name="Picture 2">
+            <a:extLst>
+              <a:ext uri="{FF2B5EF4-FFF2-40B4-BE49-F238E27FC236}">
+                <a16:creationId xmlns:a16="http://schemas.microsoft.com/office/drawing/2014/main" id="{8571A6AD-DBE4-A4DF-014A-A91F9570DBC0}"/>
+              </a:ext>
+            </a:extLst>
+          </p:cNvPr>
+          <p:cNvPicPr>
+            <a:picLocks noChangeAspect="1" noChangeArrowheads="1"/>
+          </p:cNvPicPr>
+          <p:nvPr/>
+        </p:nvPicPr>
+        <p:blipFill>
+          <a:blip r:embed="rId2">
+            <a:alphaModFix amt="35000"/>
+            <a:extLst>
+              <a:ext uri="{28A0092B-C50C-407E-A947-70E740481C1C}">
+                <a14:useLocalDpi xmlns:a14="http://schemas.microsoft.com/office/drawing/2010/main" val="0"/>
+              </a:ext>
+            </a:extLst>
+          </a:blip>
+          <a:srcRect/>
+          <a:stretch>
+            <a:fillRect/>
+          </a:stretch>
+        </p:blipFill>
+        <p:spPr bwMode="auto">
+          <a:xfrm>
+            <a:off x="0" y="0"/>
+            <a:ext cx="12192000" cy="6858000"/>
+          </a:xfrm>
+          <a:prstGeom prst="rect">
+            <a:avLst/>
+          </a:prstGeom>
+          <a:noFill/>
+          <a:extLst>
+            <a:ext uri="{909E8E84-426E-40DD-AFC4-6F175D3DCCD1}">
+              <a14:hiddenFill xmlns:a14="http://schemas.microsoft.com/office/drawing/2010/main">
+                <a:solidFill>
+                  <a:srgbClr val="FFFFFF"/>
+                </a:solidFill>
+              </a14:hiddenFill>
+            </a:ext>
+          </a:extLst>
+        </p:spPr>
+      </p:pic>
       <p:sp>
         <p:nvSpPr>
           <p:cNvPr id="4" name="Title 3">
@@ -9855,15 +10035,7 @@
           <a:p>
             <a:r>
               <a:rPr lang="en-CA" dirty="0"/>
-              <a:t>5. Bring ‘</a:t>
-            </a:r>
-            <a:r>
-              <a:rPr lang="en-CA" dirty="0" err="1"/>
-              <a:t>em</a:t>
-            </a:r>
-            <a:r>
-              <a:rPr lang="en-CA" dirty="0"/>
-              <a:t> all home</a:t>
+              <a:t>5. Putting it All Together</a:t>
             </a:r>
           </a:p>
         </p:txBody>
@@ -9901,189 +10073,297 @@
             </a:pPr>
             <a:r>
               <a:rPr lang="en-CA" dirty="0"/>
-              <a:t>Time to go get them peeps!</a:t>
-            </a:r>
-          </a:p>
-          <a:p>
+              <a:t>Let’s look at how we can piece together a full hierarchy of service.</a:t>
+            </a:r>
+          </a:p>
+          <a:p>
+            <a:pPr lvl="1"/>
             <a:r>
               <a:rPr lang="en-CA" dirty="0"/>
-              <a:t>Allow the </a:t>
-            </a:r>
-            <a:r>
-              <a:rPr lang="en-CA" dirty="0">
+              <a:t>Service to take orders at the table.</a:t>
+            </a:r>
+          </a:p>
+          <a:p>
+            <a:pPr lvl="1"/>
+            <a:r>
+              <a:rPr lang="en-CA" dirty="0"/>
+              <a:t>Recursive call to accept all orders.</a:t>
+            </a:r>
+          </a:p>
+          <a:p>
+            <a:pPr lvl="1"/>
+            <a:r>
+              <a:rPr lang="en-CA" dirty="0"/>
+              <a:t>Chef availability for making meals.</a:t>
+            </a:r>
+          </a:p>
+          <a:p>
+            <a:pPr lvl="1"/>
+            <a:r>
+              <a:rPr lang="en-CA" dirty="0"/>
+              <a:t>Recursive movement on the “hands” call.</a:t>
+            </a:r>
+          </a:p>
+          <a:p>
+            <a:pPr lvl="1"/>
+            <a:r>
+              <a:rPr lang="en-CA" dirty="0"/>
+              <a:t>Diversity in the meals ordered on the night.</a:t>
+            </a:r>
+          </a:p>
+          <a:p>
+            <a:pPr marL="0" indent="0">
+              <a:buNone/>
+            </a:pPr>
+            <a:endParaRPr lang="en-CA" dirty="0"/>
+          </a:p>
+          <a:p>
+            <a:pPr marL="0" indent="0">
+              <a:buNone/>
+            </a:pPr>
+            <a:r>
+              <a:rPr lang="en-CA" b="1" dirty="0"/>
+              <a:t>Ideas to extend</a:t>
+            </a:r>
+            <a:r>
+              <a:rPr lang="en-CA" dirty="0"/>
+              <a:t>:</a:t>
+            </a:r>
+          </a:p>
+          <a:p>
+            <a:pPr lvl="1"/>
+            <a:r>
+              <a:rPr lang="en-CA" dirty="0"/>
+              <a:t>Bring back recipes; chef specialties; deal with (dirty) dishes; finite ingredients; fetching things from the walk-in fridge; etc.</a:t>
+            </a:r>
+          </a:p>
+        </p:txBody>
+      </p:sp>
+      <p:sp>
+        <p:nvSpPr>
+          <p:cNvPr id="2" name="Content Placeholder 4">
+            <a:extLst>
+              <a:ext uri="{FF2B5EF4-FFF2-40B4-BE49-F238E27FC236}">
+                <a16:creationId xmlns:a16="http://schemas.microsoft.com/office/drawing/2014/main" id="{71511909-E613-95F4-2BF2-88037169F204}"/>
+              </a:ext>
+            </a:extLst>
+          </p:cNvPr>
+          <p:cNvSpPr txBox="1">
+            <a:spLocks/>
+          </p:cNvSpPr>
+          <p:nvPr/>
+        </p:nvSpPr>
+        <p:spPr>
+          <a:xfrm>
+            <a:off x="8122920" y="3122612"/>
+            <a:ext cx="2707640" cy="612775"/>
+          </a:xfrm>
+          <a:prstGeom prst="rect">
+            <a:avLst/>
+          </a:prstGeom>
+        </p:spPr>
+        <p:txBody>
+          <a:bodyPr vert="horz" lIns="91440" tIns="45720" rIns="91440" bIns="45720" rtlCol="0">
+            <a:normAutofit/>
+          </a:bodyPr>
+          <a:lstStyle>
+            <a:lvl1pPr marL="228600" indent="-228600" algn="l" defTabSz="914400" rtl="0" eaLnBrk="1" latinLnBrk="0" hangingPunct="1">
+              <a:lnSpc>
+                <a:spcPct val="90000"/>
+              </a:lnSpc>
+              <a:spcBef>
+                <a:spcPts val="1000"/>
+              </a:spcBef>
+              <a:buFont typeface="Arial" panose="020B0604020202020204" pitchFamily="34" charset="0"/>
+              <a:buChar char="•"/>
+              <a:defRPr sz="2800" kern="1200">
                 <a:solidFill>
-                  <a:schemeClr val="accent3"/>
+                  <a:schemeClr val="tx1"/>
                 </a:solidFill>
-              </a:rPr>
-              <a:t>shuttle</a:t>
-            </a:r>
-            <a:r>
-              <a:rPr lang="en-CA" dirty="0"/>
-              <a:t> to </a:t>
-            </a:r>
-            <a:r>
-              <a:rPr lang="en-CA" b="1" dirty="0">
+                <a:latin typeface="+mn-lt"/>
+                <a:ea typeface="+mn-ea"/>
+                <a:cs typeface="+mn-cs"/>
+              </a:defRPr>
+            </a:lvl1pPr>
+            <a:lvl2pPr marL="685800" indent="-228600" algn="l" defTabSz="914400" rtl="0" eaLnBrk="1" latinLnBrk="0" hangingPunct="1">
+              <a:lnSpc>
+                <a:spcPct val="90000"/>
+              </a:lnSpc>
+              <a:spcBef>
+                <a:spcPts val="500"/>
+              </a:spcBef>
+              <a:buFont typeface="Arial" panose="020B0604020202020204" pitchFamily="34" charset="0"/>
+              <a:buChar char="•"/>
+              <a:defRPr sz="2400" kern="1200">
                 <a:solidFill>
-                  <a:schemeClr val="accent4"/>
+                  <a:schemeClr val="tx1"/>
                 </a:solidFill>
-              </a:rPr>
-              <a:t>stop</a:t>
-            </a:r>
-            <a:r>
-              <a:rPr lang="en-CA" dirty="0"/>
-              <a:t>, but then stay stopped until the </a:t>
-            </a:r>
-            <a:r>
-              <a:rPr lang="en-CA" b="1" dirty="0">
+                <a:latin typeface="+mn-lt"/>
+                <a:ea typeface="+mn-ea"/>
+                <a:cs typeface="+mn-cs"/>
+              </a:defRPr>
+            </a:lvl2pPr>
+            <a:lvl3pPr marL="1143000" indent="-228600" algn="l" defTabSz="914400" rtl="0" eaLnBrk="1" latinLnBrk="0" hangingPunct="1">
+              <a:lnSpc>
+                <a:spcPct val="90000"/>
+              </a:lnSpc>
+              <a:spcBef>
+                <a:spcPts val="500"/>
+              </a:spcBef>
+              <a:buFont typeface="Arial" panose="020B0604020202020204" pitchFamily="34" charset="0"/>
+              <a:buChar char="•"/>
+              <a:defRPr sz="2000" kern="1200">
                 <a:solidFill>
-                  <a:schemeClr val="accent6">
-                    <a:lumMod val="60000"/>
-                    <a:lumOff val="40000"/>
-                  </a:schemeClr>
+                  <a:schemeClr val="tx1"/>
                 </a:solidFill>
-              </a:rPr>
-              <a:t>idle-timer</a:t>
-            </a:r>
-            <a:r>
-              <a:rPr lang="en-CA" dirty="0"/>
-              <a:t> process completes</a:t>
-            </a:r>
-          </a:p>
-          <a:p>
-            <a:r>
-              <a:rPr lang="en-CA" dirty="0"/>
-              <a:t>Let</a:t>
-            </a:r>
-            <a:r>
-              <a:rPr lang="en-CA" dirty="0">
+                <a:latin typeface="+mn-lt"/>
+                <a:ea typeface="+mn-ea"/>
+                <a:cs typeface="+mn-cs"/>
+              </a:defRPr>
+            </a:lvl3pPr>
+            <a:lvl4pPr marL="1600200" indent="-228600" algn="l" defTabSz="914400" rtl="0" eaLnBrk="1" latinLnBrk="0" hangingPunct="1">
+              <a:lnSpc>
+                <a:spcPct val="90000"/>
+              </a:lnSpc>
+              <a:spcBef>
+                <a:spcPts val="500"/>
+              </a:spcBef>
+              <a:buFont typeface="Arial" panose="020B0604020202020204" pitchFamily="34" charset="0"/>
+              <a:buChar char="•"/>
+              <a:defRPr sz="1800" kern="1200">
                 <a:solidFill>
-                  <a:schemeClr val="accent3"/>
+                  <a:schemeClr val="tx1"/>
                 </a:solidFill>
-              </a:rPr>
-              <a:t> people</a:t>
-            </a:r>
-            <a:r>
-              <a:rPr lang="en-CA" dirty="0"/>
-              <a:t> </a:t>
-            </a:r>
-            <a:r>
-              <a:rPr lang="en-CA" b="1" dirty="0">
+                <a:latin typeface="+mn-lt"/>
+                <a:ea typeface="+mn-ea"/>
+                <a:cs typeface="+mn-cs"/>
+              </a:defRPr>
+            </a:lvl4pPr>
+            <a:lvl5pPr marL="2057400" indent="-228600" algn="l" defTabSz="914400" rtl="0" eaLnBrk="1" latinLnBrk="0" hangingPunct="1">
+              <a:lnSpc>
+                <a:spcPct val="90000"/>
+              </a:lnSpc>
+              <a:spcBef>
+                <a:spcPts val="500"/>
+              </a:spcBef>
+              <a:buFont typeface="Arial" panose="020B0604020202020204" pitchFamily="34" charset="0"/>
+              <a:buChar char="•"/>
+              <a:defRPr sz="1800" kern="1200">
                 <a:solidFill>
-                  <a:schemeClr val="accent4"/>
+                  <a:schemeClr val="tx1"/>
                 </a:solidFill>
-              </a:rPr>
-              <a:t>board</a:t>
-            </a:r>
-            <a:r>
-              <a:rPr lang="en-CA" dirty="0"/>
-              <a:t> or </a:t>
-            </a:r>
-            <a:r>
-              <a:rPr lang="en-CA" b="1" dirty="0" err="1">
+                <a:latin typeface="+mn-lt"/>
+                <a:ea typeface="+mn-ea"/>
+                <a:cs typeface="+mn-cs"/>
+              </a:defRPr>
+            </a:lvl5pPr>
+            <a:lvl6pPr marL="2514600" indent="-228600" algn="l" defTabSz="914400" rtl="0" eaLnBrk="1" latinLnBrk="0" hangingPunct="1">
+              <a:lnSpc>
+                <a:spcPct val="90000"/>
+              </a:lnSpc>
+              <a:spcBef>
+                <a:spcPts val="500"/>
+              </a:spcBef>
+              <a:buFont typeface="Arial" panose="020B0604020202020204" pitchFamily="34" charset="0"/>
+              <a:buChar char="•"/>
+              <a:defRPr sz="1800" kern="1200">
                 <a:solidFill>
-                  <a:schemeClr val="accent4"/>
+                  <a:schemeClr val="tx1"/>
                 </a:solidFill>
-              </a:rPr>
-              <a:t>unboard</a:t>
-            </a:r>
-            <a:r>
-              <a:rPr lang="en-CA" dirty="0"/>
-              <a:t> depending on if they are close enough to an idling </a:t>
-            </a:r>
-            <a:r>
-              <a:rPr lang="en-CA" dirty="0">
+                <a:latin typeface="+mn-lt"/>
+                <a:ea typeface="+mn-ea"/>
+                <a:cs typeface="+mn-cs"/>
+              </a:defRPr>
+            </a:lvl6pPr>
+            <a:lvl7pPr marL="2971800" indent="-228600" algn="l" defTabSz="914400" rtl="0" eaLnBrk="1" latinLnBrk="0" hangingPunct="1">
+              <a:lnSpc>
+                <a:spcPct val="90000"/>
+              </a:lnSpc>
+              <a:spcBef>
+                <a:spcPts val="500"/>
+              </a:spcBef>
+              <a:buFont typeface="Arial" panose="020B0604020202020204" pitchFamily="34" charset="0"/>
+              <a:buChar char="•"/>
+              <a:defRPr sz="1800" kern="1200">
                 <a:solidFill>
-                  <a:schemeClr val="accent3"/>
+                  <a:schemeClr val="tx1"/>
                 </a:solidFill>
-              </a:rPr>
-              <a:t>shuttle</a:t>
-            </a:r>
-          </a:p>
-          <a:p>
-            <a:r>
-              <a:rPr lang="en-CA" dirty="0"/>
-              <a:t>Actions to </a:t>
-            </a:r>
-            <a:r>
-              <a:rPr lang="en-CA" b="1" dirty="0">
+                <a:latin typeface="+mn-lt"/>
+                <a:ea typeface="+mn-ea"/>
+                <a:cs typeface="+mn-cs"/>
+              </a:defRPr>
+            </a:lvl7pPr>
+            <a:lvl8pPr marL="3429000" indent="-228600" algn="l" defTabSz="914400" rtl="0" eaLnBrk="1" latinLnBrk="0" hangingPunct="1">
+              <a:lnSpc>
+                <a:spcPct val="90000"/>
+              </a:lnSpc>
+              <a:spcBef>
+                <a:spcPts val="500"/>
+              </a:spcBef>
+              <a:buFont typeface="Arial" panose="020B0604020202020204" pitchFamily="34" charset="0"/>
+              <a:buChar char="•"/>
+              <a:defRPr sz="1800" kern="1200">
                 <a:solidFill>
-                  <a:schemeClr val="accent4"/>
+                  <a:schemeClr val="tx1"/>
                 </a:solidFill>
-              </a:rPr>
-              <a:t>serve</a:t>
-            </a:r>
-            <a:r>
-              <a:rPr lang="en-CA" dirty="0"/>
-              <a:t> a </a:t>
-            </a:r>
-            <a:r>
-              <a:rPr lang="en-CA" dirty="0">
+                <a:latin typeface="+mn-lt"/>
+                <a:ea typeface="+mn-ea"/>
+                <a:cs typeface="+mn-cs"/>
+              </a:defRPr>
+            </a:lvl8pPr>
+            <a:lvl9pPr marL="3886200" indent="-228600" algn="l" defTabSz="914400" rtl="0" eaLnBrk="1" latinLnBrk="0" hangingPunct="1">
+              <a:lnSpc>
+                <a:spcPct val="90000"/>
+              </a:lnSpc>
+              <a:spcBef>
+                <a:spcPts val="500"/>
+              </a:spcBef>
+              <a:buFont typeface="Arial" panose="020B0604020202020204" pitchFamily="34" charset="0"/>
+              <a:buChar char="•"/>
+              <a:defRPr sz="1800" kern="1200">
                 <a:solidFill>
-                  <a:schemeClr val="accent3"/>
+                  <a:schemeClr val="tx1"/>
                 </a:solidFill>
-              </a:rPr>
-              <a:t>person</a:t>
-            </a:r>
-            <a:r>
-              <a:rPr lang="en-CA" dirty="0"/>
-              <a:t> or have them </a:t>
-            </a:r>
-            <a:r>
-              <a:rPr lang="en-CA" b="1" dirty="0">
-                <a:solidFill>
-                  <a:schemeClr val="accent4"/>
-                </a:solidFill>
-              </a:rPr>
-              <a:t>switch</a:t>
-            </a:r>
-            <a:r>
-              <a:rPr lang="en-CA" dirty="0"/>
-              <a:t> </a:t>
-            </a:r>
-            <a:r>
-              <a:rPr lang="en-CA" dirty="0">
-                <a:solidFill>
-                  <a:schemeClr val="accent3"/>
-                </a:solidFill>
-              </a:rPr>
-              <a:t>circuits</a:t>
-            </a:r>
-          </a:p>
-          <a:p>
-            <a:r>
-              <a:rPr lang="en-CA" dirty="0"/>
-              <a:t>Include a </a:t>
-            </a:r>
-            <a:r>
-              <a:rPr lang="en-CA" b="1" dirty="0">
+                <a:latin typeface="+mn-lt"/>
+                <a:ea typeface="+mn-ea"/>
+                <a:cs typeface="+mn-cs"/>
+              </a:defRPr>
+            </a:lvl9pPr>
+          </a:lstStyle>
+          <a:p>
+            <a:pPr marL="0" indent="0" algn="ctr">
+              <a:buFont typeface="Arial" panose="020B0604020202020204" pitchFamily="34" charset="0"/>
+              <a:buNone/>
+            </a:pPr>
+            <a:r>
+              <a:rPr lang="en-CA" sz="3200" b="1" dirty="0" err="1">
                 <a:solidFill>
                   <a:schemeClr val="accent2"/>
                 </a:solidFill>
               </a:rPr>
-              <a:t>destination</a:t>
-            </a:r>
-            <a:r>
-              <a:rPr lang="en-CA" dirty="0"/>
-              <a:t> for </a:t>
-            </a:r>
-            <a:r>
-              <a:rPr lang="en-CA" dirty="0">
+              <a:t>htn</a:t>
+            </a:r>
+            <a:r>
+              <a:rPr lang="en-CA" sz="3200" b="1" dirty="0">
                 <a:solidFill>
-                  <a:schemeClr val="accent3"/>
+                  <a:schemeClr val="accent2"/>
                 </a:solidFill>
               </a:rPr>
-              <a:t>people</a:t>
-            </a:r>
-          </a:p>
-          <a:p>
-            <a:r>
-              <a:rPr lang="en-CA" dirty="0" err="1"/>
-              <a:t>Etc</a:t>
-            </a:r>
-            <a:r>
-              <a:rPr lang="en-CA" dirty="0"/>
-              <a:t>…</a:t>
-            </a:r>
+              <a:t>  /  </a:t>
+            </a:r>
+            <a:r>
+              <a:rPr lang="en-CA" sz="3200" b="1" dirty="0" err="1">
+                <a:solidFill>
+                  <a:schemeClr val="accent2"/>
+                </a:solidFill>
+              </a:rPr>
+              <a:t>thebear</a:t>
+            </a:r>
+            <a:endParaRPr lang="en-CA" sz="3200" b="1" dirty="0">
+              <a:solidFill>
+                <a:schemeClr val="accent2"/>
+              </a:solidFill>
+            </a:endParaRPr>
           </a:p>
         </p:txBody>
       </p:sp>
@@ -10097,460 +10377,13 @@
   <p:clrMapOvr>
     <a:masterClrMapping/>
   </p:clrMapOvr>
-  <p:timing>
-    <p:tnLst>
-      <p:par>
-        <p:cTn id="1" dur="indefinite" restart="never" nodeType="tmRoot">
-          <p:childTnLst>
-            <p:seq concurrent="1" nextAc="seek">
-              <p:cTn id="2" dur="indefinite" nodeType="mainSeq">
-                <p:childTnLst>
-                  <p:par>
-                    <p:cTn id="3" fill="hold">
-                      <p:stCondLst>
-                        <p:cond delay="indefinite"/>
-                      </p:stCondLst>
-                      <p:childTnLst>
-                        <p:par>
-                          <p:cTn id="4" fill="hold">
-                            <p:stCondLst>
-                              <p:cond delay="0"/>
-                            </p:stCondLst>
-                            <p:childTnLst>
-                              <p:par>
-                                <p:cTn id="5" presetID="10" presetClass="entr" presetSubtype="0" fill="hold" grpId="0" nodeType="clickEffect">
-                                  <p:stCondLst>
-                                    <p:cond delay="0"/>
-                                  </p:stCondLst>
-                                  <p:childTnLst>
-                                    <p:set>
-                                      <p:cBhvr>
-                                        <p:cTn id="6" dur="1" fill="hold">
-                                          <p:stCondLst>
-                                            <p:cond delay="0"/>
-                                          </p:stCondLst>
-                                        </p:cTn>
-                                        <p:tgtEl>
-                                          <p:spTgt spid="5">
-                                            <p:txEl>
-                                              <p:pRg st="1" end="1"/>
-                                            </p:txEl>
-                                          </p:spTgt>
-                                        </p:tgtEl>
-                                        <p:attrNameLst>
-                                          <p:attrName>style.visibility</p:attrName>
-                                        </p:attrNameLst>
-                                      </p:cBhvr>
-                                      <p:to>
-                                        <p:strVal val="visible"/>
-                                      </p:to>
-                                    </p:set>
-                                    <p:animEffect transition="in" filter="fade">
-                                      <p:cBhvr>
-                                        <p:cTn id="7" dur="500"/>
-                                        <p:tgtEl>
-                                          <p:spTgt spid="5">
-                                            <p:txEl>
-                                              <p:pRg st="1" end="1"/>
-                                            </p:txEl>
-                                          </p:spTgt>
-                                        </p:tgtEl>
-                                      </p:cBhvr>
-                                    </p:animEffect>
-                                  </p:childTnLst>
-                                </p:cTn>
-                              </p:par>
-                            </p:childTnLst>
-                          </p:cTn>
-                        </p:par>
-                        <p:par>
-                          <p:cTn id="8" fill="hold">
-                            <p:stCondLst>
-                              <p:cond delay="500"/>
-                            </p:stCondLst>
-                            <p:childTnLst>
-                              <p:par>
-                                <p:cTn id="9" presetID="10" presetClass="entr" presetSubtype="0" fill="hold" grpId="0" nodeType="afterEffect">
-                                  <p:stCondLst>
-                                    <p:cond delay="0"/>
-                                  </p:stCondLst>
-                                  <p:childTnLst>
-                                    <p:set>
-                                      <p:cBhvr>
-                                        <p:cTn id="10" dur="1" fill="hold">
-                                          <p:stCondLst>
-                                            <p:cond delay="0"/>
-                                          </p:stCondLst>
-                                        </p:cTn>
-                                        <p:tgtEl>
-                                          <p:spTgt spid="5">
-                                            <p:txEl>
-                                              <p:pRg st="2" end="2"/>
-                                            </p:txEl>
-                                          </p:spTgt>
-                                        </p:tgtEl>
-                                        <p:attrNameLst>
-                                          <p:attrName>style.visibility</p:attrName>
-                                        </p:attrNameLst>
-                                      </p:cBhvr>
-                                      <p:to>
-                                        <p:strVal val="visible"/>
-                                      </p:to>
-                                    </p:set>
-                                    <p:animEffect transition="in" filter="fade">
-                                      <p:cBhvr>
-                                        <p:cTn id="11" dur="500"/>
-                                        <p:tgtEl>
-                                          <p:spTgt spid="5">
-                                            <p:txEl>
-                                              <p:pRg st="2" end="2"/>
-                                            </p:txEl>
-                                          </p:spTgt>
-                                        </p:tgtEl>
-                                      </p:cBhvr>
-                                    </p:animEffect>
-                                  </p:childTnLst>
-                                </p:cTn>
-                              </p:par>
-                            </p:childTnLst>
-                          </p:cTn>
-                        </p:par>
-                        <p:par>
-                          <p:cTn id="12" fill="hold">
-                            <p:stCondLst>
-                              <p:cond delay="1000"/>
-                            </p:stCondLst>
-                            <p:childTnLst>
-                              <p:par>
-                                <p:cTn id="13" presetID="10" presetClass="entr" presetSubtype="0" fill="hold" grpId="0" nodeType="afterEffect">
-                                  <p:stCondLst>
-                                    <p:cond delay="0"/>
-                                  </p:stCondLst>
-                                  <p:childTnLst>
-                                    <p:set>
-                                      <p:cBhvr>
-                                        <p:cTn id="14" dur="1" fill="hold">
-                                          <p:stCondLst>
-                                            <p:cond delay="0"/>
-                                          </p:stCondLst>
-                                        </p:cTn>
-                                        <p:tgtEl>
-                                          <p:spTgt spid="5">
-                                            <p:txEl>
-                                              <p:pRg st="3" end="3"/>
-                                            </p:txEl>
-                                          </p:spTgt>
-                                        </p:tgtEl>
-                                        <p:attrNameLst>
-                                          <p:attrName>style.visibility</p:attrName>
-                                        </p:attrNameLst>
-                                      </p:cBhvr>
-                                      <p:to>
-                                        <p:strVal val="visible"/>
-                                      </p:to>
-                                    </p:set>
-                                    <p:animEffect transition="in" filter="fade">
-                                      <p:cBhvr>
-                                        <p:cTn id="15" dur="500"/>
-                                        <p:tgtEl>
-                                          <p:spTgt spid="5">
-                                            <p:txEl>
-                                              <p:pRg st="3" end="3"/>
-                                            </p:txEl>
-                                          </p:spTgt>
-                                        </p:tgtEl>
-                                      </p:cBhvr>
-                                    </p:animEffect>
-                                  </p:childTnLst>
-                                </p:cTn>
-                              </p:par>
-                            </p:childTnLst>
-                          </p:cTn>
-                        </p:par>
-                        <p:par>
-                          <p:cTn id="16" fill="hold">
-                            <p:stCondLst>
-                              <p:cond delay="1500"/>
-                            </p:stCondLst>
-                            <p:childTnLst>
-                              <p:par>
-                                <p:cTn id="17" presetID="10" presetClass="entr" presetSubtype="0" fill="hold" grpId="0" nodeType="afterEffect">
-                                  <p:stCondLst>
-                                    <p:cond delay="0"/>
-                                  </p:stCondLst>
-                                  <p:childTnLst>
-                                    <p:set>
-                                      <p:cBhvr>
-                                        <p:cTn id="18" dur="1" fill="hold">
-                                          <p:stCondLst>
-                                            <p:cond delay="0"/>
-                                          </p:stCondLst>
-                                        </p:cTn>
-                                        <p:tgtEl>
-                                          <p:spTgt spid="5">
-                                            <p:txEl>
-                                              <p:pRg st="4" end="4"/>
-                                            </p:txEl>
-                                          </p:spTgt>
-                                        </p:tgtEl>
-                                        <p:attrNameLst>
-                                          <p:attrName>style.visibility</p:attrName>
-                                        </p:attrNameLst>
-                                      </p:cBhvr>
-                                      <p:to>
-                                        <p:strVal val="visible"/>
-                                      </p:to>
-                                    </p:set>
-                                    <p:animEffect transition="in" filter="fade">
-                                      <p:cBhvr>
-                                        <p:cTn id="19" dur="500"/>
-                                        <p:tgtEl>
-                                          <p:spTgt spid="5">
-                                            <p:txEl>
-                                              <p:pRg st="4" end="4"/>
-                                            </p:txEl>
-                                          </p:spTgt>
-                                        </p:tgtEl>
-                                      </p:cBhvr>
-                                    </p:animEffect>
-                                  </p:childTnLst>
-                                </p:cTn>
-                              </p:par>
-                            </p:childTnLst>
-                          </p:cTn>
-                        </p:par>
-                        <p:par>
-                          <p:cTn id="20" fill="hold">
-                            <p:stCondLst>
-                              <p:cond delay="2000"/>
-                            </p:stCondLst>
-                            <p:childTnLst>
-                              <p:par>
-                                <p:cTn id="21" presetID="10" presetClass="entr" presetSubtype="0" fill="hold" grpId="0" nodeType="afterEffect">
-                                  <p:stCondLst>
-                                    <p:cond delay="0"/>
-                                  </p:stCondLst>
-                                  <p:childTnLst>
-                                    <p:set>
-                                      <p:cBhvr>
-                                        <p:cTn id="22" dur="1" fill="hold">
-                                          <p:stCondLst>
-                                            <p:cond delay="0"/>
-                                          </p:stCondLst>
-                                        </p:cTn>
-                                        <p:tgtEl>
-                                          <p:spTgt spid="5">
-                                            <p:txEl>
-                                              <p:pRg st="5" end="5"/>
-                                            </p:txEl>
-                                          </p:spTgt>
-                                        </p:tgtEl>
-                                        <p:attrNameLst>
-                                          <p:attrName>style.visibility</p:attrName>
-                                        </p:attrNameLst>
-                                      </p:cBhvr>
-                                      <p:to>
-                                        <p:strVal val="visible"/>
-                                      </p:to>
-                                    </p:set>
-                                    <p:animEffect transition="in" filter="fade">
-                                      <p:cBhvr>
-                                        <p:cTn id="23" dur="500"/>
-                                        <p:tgtEl>
-                                          <p:spTgt spid="5">
-                                            <p:txEl>
-                                              <p:pRg st="5" end="5"/>
-                                            </p:txEl>
-                                          </p:spTgt>
-                                        </p:tgtEl>
-                                      </p:cBhvr>
-                                    </p:animEffect>
-                                  </p:childTnLst>
-                                </p:cTn>
-                              </p:par>
-                            </p:childTnLst>
-                          </p:cTn>
-                        </p:par>
-                      </p:childTnLst>
-                    </p:cTn>
-                  </p:par>
-                </p:childTnLst>
-              </p:cTn>
-              <p:prevCondLst>
-                <p:cond evt="onPrev" delay="0">
-                  <p:tgtEl>
-                    <p:sldTgt/>
-                  </p:tgtEl>
-                </p:cond>
-              </p:prevCondLst>
-              <p:nextCondLst>
-                <p:cond evt="onNext" delay="0">
-                  <p:tgtEl>
-                    <p:sldTgt/>
-                  </p:tgtEl>
-                </p:cond>
-              </p:nextCondLst>
-            </p:seq>
-          </p:childTnLst>
-        </p:cTn>
-      </p:par>
-    </p:tnLst>
-    <p:bldLst>
-      <p:bldP spid="5" grpId="0" uiExpand="1" build="p"/>
-    </p:bldLst>
-  </p:timing>
-</p:sld>
-</file>
-
-<file path=ppt/slides/slide16.xml><?xml version="1.0" encoding="utf-8"?>
-<p:sld xmlns:a="http://schemas.openxmlformats.org/drawingml/2006/main" xmlns:r="http://schemas.openxmlformats.org/officeDocument/2006/relationships" xmlns:p="http://schemas.openxmlformats.org/presentationml/2006/main" showMasterSp="0">
-  <p:cSld>
-    <p:spTree>
-      <p:nvGrpSpPr>
-        <p:cNvPr id="1" name=""/>
-        <p:cNvGrpSpPr/>
-        <p:nvPr/>
-      </p:nvGrpSpPr>
-      <p:grpSpPr>
-        <a:xfrm>
-          <a:off x="0" y="0"/>
-          <a:ext cx="0" cy="0"/>
-          <a:chOff x="0" y="0"/>
-          <a:chExt cx="0" cy="0"/>
-        </a:xfrm>
-      </p:grpSpPr>
-      <p:sp>
-        <p:nvSpPr>
-          <p:cNvPr id="5" name="Content Placeholder 4">
-            <a:extLst>
-              <a:ext uri="{FF2B5EF4-FFF2-40B4-BE49-F238E27FC236}">
-                <a16:creationId xmlns:a16="http://schemas.microsoft.com/office/drawing/2014/main" id="{916B2140-6178-6477-FAC2-4FC081B9C2C5}"/>
-              </a:ext>
-            </a:extLst>
-          </p:cNvPr>
-          <p:cNvSpPr>
-            <a:spLocks noGrp="1"/>
-          </p:cNvSpPr>
-          <p:nvPr>
-            <p:ph idx="1"/>
-          </p:nvPr>
-        </p:nvSpPr>
-        <p:spPr/>
-        <p:txBody>
-          <a:bodyPr/>
-          <a:lstStyle/>
-          <a:p>
-            <a:endParaRPr lang="en-CA" dirty="0"/>
-          </a:p>
-          <a:p>
-            <a:endParaRPr lang="en-CA" dirty="0"/>
-          </a:p>
-          <a:p>
-            <a:pPr marL="0" indent="0" algn="ctr">
-              <a:buNone/>
-            </a:pPr>
-            <a:r>
-              <a:rPr lang="en-CA" sz="2800" dirty="0"/>
-              <a:t>hybrid  /  </a:t>
-            </a:r>
-            <a:r>
-              <a:rPr lang="en-CA" sz="2800" dirty="0" err="1"/>
-              <a:t>dirbyh</a:t>
-            </a:r>
-            <a:endParaRPr lang="en-CA" sz="2800" dirty="0"/>
-          </a:p>
-          <a:p>
-            <a:pPr marL="0" indent="0" algn="ctr">
-              <a:buNone/>
-            </a:pPr>
-            <a:endParaRPr lang="en-CA" dirty="0"/>
-          </a:p>
-          <a:p>
-            <a:pPr marL="0" indent="0" algn="ctr">
-              <a:buNone/>
-            </a:pPr>
-            <a:r>
-              <a:rPr lang="en-CA" sz="2800" dirty="0"/>
-              <a:t>enhsp-2020 --domain domain.5.pddl --problem problem.5.pddl</a:t>
-            </a:r>
-            <a:br>
-              <a:rPr lang="en-CA" sz="2800" dirty="0"/>
-            </a:br>
-            <a:r>
-              <a:rPr lang="en-CA" sz="2800" b="1" dirty="0">
-                <a:solidFill>
-                  <a:schemeClr val="accent2">
-                    <a:lumMod val="40000"/>
-                    <a:lumOff val="60000"/>
-                  </a:schemeClr>
-                </a:solidFill>
-              </a:rPr>
-              <a:t>-ha true    -h </a:t>
-            </a:r>
-            <a:r>
-              <a:rPr lang="en-CA" sz="2800" b="1" dirty="0" err="1">
-                <a:solidFill>
-                  <a:schemeClr val="accent2">
-                    <a:lumMod val="40000"/>
-                    <a:lumOff val="60000"/>
-                  </a:schemeClr>
-                </a:solidFill>
-              </a:rPr>
-              <a:t>hmrp</a:t>
-            </a:r>
-            <a:r>
-              <a:rPr lang="en-CA" sz="2800" b="1" dirty="0">
-                <a:solidFill>
-                  <a:schemeClr val="accent2">
-                    <a:lumMod val="40000"/>
-                    <a:lumOff val="60000"/>
-                  </a:schemeClr>
-                </a:solidFill>
-              </a:rPr>
-              <a:t>    -</a:t>
-            </a:r>
-            <a:r>
-              <a:rPr lang="en-CA" sz="2800" b="1" dirty="0" err="1">
-                <a:solidFill>
-                  <a:schemeClr val="accent2">
-                    <a:lumMod val="40000"/>
-                    <a:lumOff val="60000"/>
-                  </a:schemeClr>
-                </a:solidFill>
-              </a:rPr>
-              <a:t>wh</a:t>
-            </a:r>
-            <a:r>
-              <a:rPr lang="en-CA" sz="2800" b="1" dirty="0">
-                <a:solidFill>
-                  <a:schemeClr val="accent2">
-                    <a:lumMod val="40000"/>
-                    <a:lumOff val="60000"/>
-                  </a:schemeClr>
-                </a:solidFill>
-              </a:rPr>
-              <a:t> 4</a:t>
-            </a:r>
-          </a:p>
-        </p:txBody>
-      </p:sp>
-    </p:spTree>
-    <p:extLst>
-      <p:ext uri="{BB962C8B-B14F-4D97-AF65-F5344CB8AC3E}">
-        <p14:creationId xmlns:p14="http://schemas.microsoft.com/office/powerpoint/2010/main" val="4258168544"/>
-      </p:ext>
-    </p:extLst>
-  </p:cSld>
-  <p:clrMapOvr>
-    <a:masterClrMapping/>
-  </p:clrMapOvr>
-  <mc:AlternateContent xmlns:mc="http://schemas.openxmlformats.org/markup-compatibility/2006" xmlns:p14="http://schemas.microsoft.com/office/powerpoint/2010/main">
-    <mc:Choice Requires="p14">
+  <mc:AlternateContent xmlns:mc="http://schemas.openxmlformats.org/markup-compatibility/2006">
+    <mc:Choice xmlns:p14="http://schemas.microsoft.com/office/powerpoint/2010/main" Requires="p14">
       <p:transition spd="med" p14:dur="700">
         <p:fade/>
       </p:transition>
     </mc:Choice>
-    <mc:Fallback xmlns="">
+    <mc:Fallback>
       <p:transition spd="med">
         <p:fade/>
       </p:transition>
@@ -10559,7 +10392,7 @@
 </p:sld>
 </file>
 
-<file path=ppt/slides/slide17.xml><?xml version="1.0" encoding="utf-8"?>
+<file path=ppt/slides/slide16.xml><?xml version="1.0" encoding="utf-8"?>
 <p:sld xmlns:a="http://schemas.openxmlformats.org/drawingml/2006/main" xmlns:r="http://schemas.openxmlformats.org/officeDocument/2006/relationships" xmlns:p="http://schemas.openxmlformats.org/presentationml/2006/main" showMasterSp="0">
   <p:cSld>
     <p:spTree>
@@ -11117,6 +10950,18 @@
               <a:t>, </a:t>
             </a:r>
             <a:r>
+              <a:rPr lang="fr-FR" b="0" dirty="0" err="1">
+                <a:solidFill>
+                  <a:schemeClr val="accent2"/>
+                </a:solidFill>
+              </a:rPr>
+              <a:t>ordered</a:t>
+            </a:r>
+            <a:r>
+              <a:rPr lang="fr-FR" b="0" dirty="0"/>
+              <a:t>, </a:t>
+            </a:r>
+            <a:r>
               <a:rPr lang="fr-FR" b="1" dirty="0">
                 <a:solidFill>
                   <a:schemeClr val="accent2"/>
@@ -11583,7 +11428,9 @@
           </a:xfrm>
         </p:spPr>
         <p:txBody>
-          <a:bodyPr/>
+          <a:bodyPr>
+            <a:normAutofit fontScale="92500"/>
+          </a:bodyPr>
           <a:lstStyle/>
           <a:p>
             <a:pPr marL="0" indent="0">
@@ -11600,33 +11447,13 @@
           </a:p>
           <a:p>
             <a:r>
-              <a:rPr lang="en-CA" b="1" dirty="0">
-                <a:solidFill>
-                  <a:schemeClr val="accent4"/>
-                </a:solidFill>
-              </a:rPr>
-              <a:t>light-change</a:t>
-            </a:r>
-            <a:r>
               <a:rPr lang="en-CA" dirty="0"/>
-              <a:t>: Action to switch which </a:t>
-            </a:r>
-            <a:r>
-              <a:rPr lang="en-CA" dirty="0">
-                <a:solidFill>
-                  <a:schemeClr val="accent3"/>
-                </a:solidFill>
-              </a:rPr>
-              <a:t>circuit</a:t>
-            </a:r>
-            <a:r>
-              <a:rPr lang="en-CA" dirty="0"/>
-              <a:t> is going</a:t>
-            </a:r>
-          </a:p>
-          <a:p>
-            <a:r>
-              <a:rPr lang="en-CA" b="1" dirty="0">
+              <a:t>We’d like to serve a couple either a 2- or 3-course meal</a:t>
+            </a:r>
+          </a:p>
+          <a:p>
+            <a:r>
+              <a:rPr lang="en-US" b="0" dirty="0" err="1">
                 <a:solidFill>
                   <a:schemeClr val="accent6">
                     <a:lumMod val="60000"/>
@@ -11634,40 +11461,112 @@
                   </a:schemeClr>
                 </a:solidFill>
               </a:rPr>
-              <a:t>drive</a:t>
-            </a:r>
-            <a:r>
-              <a:rPr lang="en-CA" dirty="0"/>
-              <a:t>: Process to move the “going” </a:t>
-            </a:r>
-            <a:r>
-              <a:rPr lang="en-CA" dirty="0">
+              <a:t>m_server</a:t>
+            </a:r>
+            <a:r>
+              <a:rPr lang="en-US" b="0" dirty="0">
                 <a:solidFill>
-                  <a:schemeClr val="accent3"/>
+                  <a:schemeClr val="accent6">
+                    <a:lumMod val="60000"/>
+                    <a:lumOff val="40000"/>
+                  </a:schemeClr>
                 </a:solidFill>
               </a:rPr>
-              <a:t>shuttles</a:t>
+              <a:t>-couple</a:t>
             </a:r>
             <a:r>
               <a:rPr lang="en-CA" dirty="0"/>
-              <a:t> along</a:t>
-            </a:r>
-          </a:p>
-          <a:p>
-            <a:r>
-              <a:rPr lang="en-CA" b="1" dirty="0">
+              <a:t>: Prepares a meal for each</a:t>
+            </a:r>
+          </a:p>
+          <a:p>
+            <a:r>
+              <a:rPr lang="en-US" b="0" dirty="0" err="1">
                 <a:solidFill>
-                  <a:schemeClr val="accent4"/>
+                  <a:schemeClr val="accent6">
+                    <a:lumMod val="60000"/>
+                    <a:lumOff val="40000"/>
+                  </a:schemeClr>
                 </a:solidFill>
               </a:rPr>
-              <a:t>finish</a:t>
+              <a:t>m_three</a:t>
+            </a:r>
+            <a:r>
+              <a:rPr lang="en-US" b="0" dirty="0">
+                <a:solidFill>
+                  <a:schemeClr val="accent6">
+                    <a:lumMod val="60000"/>
+                    <a:lumOff val="40000"/>
+                  </a:schemeClr>
+                </a:solidFill>
+              </a:rPr>
+              <a:t>-course-meal</a:t>
             </a:r>
             <a:r>
               <a:rPr lang="en-CA" dirty="0"/>
-              <a:t>: Action that captures what we want to have happen</a:t>
-            </a:r>
-          </a:p>
-          <a:p>
+              <a:t>: Prepares a 3-course meal</a:t>
+            </a:r>
+          </a:p>
+          <a:p>
+            <a:r>
+              <a:rPr lang="en-US" b="0" dirty="0" err="1">
+                <a:solidFill>
+                  <a:schemeClr val="accent6">
+                    <a:lumMod val="60000"/>
+                    <a:lumOff val="40000"/>
+                  </a:schemeClr>
+                </a:solidFill>
+              </a:rPr>
+              <a:t>m_two</a:t>
+            </a:r>
+            <a:r>
+              <a:rPr lang="en-US" b="0" dirty="0">
+                <a:solidFill>
+                  <a:schemeClr val="accent6">
+                    <a:lumMod val="60000"/>
+                    <a:lumOff val="40000"/>
+                  </a:schemeClr>
+                </a:solidFill>
+              </a:rPr>
+              <a:t>-course-meal</a:t>
+            </a:r>
+            <a:r>
+              <a:rPr lang="en-CA" dirty="0"/>
+              <a:t>: Prepares a 2-course meal</a:t>
+            </a:r>
+          </a:p>
+          <a:p>
+            <a:r>
+              <a:rPr lang="en-US" b="0" dirty="0" err="1">
+                <a:solidFill>
+                  <a:schemeClr val="accent6">
+                    <a:lumMod val="60000"/>
+                    <a:lumOff val="40000"/>
+                  </a:schemeClr>
+                </a:solidFill>
+              </a:rPr>
+              <a:t>m_prepare</a:t>
+            </a:r>
+            <a:r>
+              <a:rPr lang="en-US" b="0" dirty="0">
+                <a:solidFill>
+                  <a:schemeClr val="accent6">
+                    <a:lumMod val="60000"/>
+                    <a:lumOff val="40000"/>
+                  </a:schemeClr>
+                </a:solidFill>
+              </a:rPr>
+              <a:t>-ingredients</a:t>
+            </a:r>
+            <a:r>
+              <a:rPr lang="en-CA" dirty="0"/>
+              <a:t>: Recursive definition to prepare an ingredient</a:t>
+            </a:r>
+          </a:p>
+          <a:p>
+            <a:pPr marL="0" indent="0">
+              <a:buNone/>
+            </a:pPr>
             <a:endParaRPr lang="en-CA" dirty="0"/>
           </a:p>
           <a:p>
@@ -11680,7 +11579,7 @@
             </a:r>
             <a:r>
               <a:rPr lang="en-CA" dirty="0"/>
-              <a:t>  /  ??</a:t>
+              <a:t>  /  methods</a:t>
             </a:r>
           </a:p>
         </p:txBody>
@@ -11757,8 +11656,13 @@
             </a:r>
             <a:r>
               <a:rPr lang="en-CA" sz="2800" dirty="0"/>
-              <a:t>  /  ??</a:t>
-            </a:r>
+              <a:t>  /  </a:t>
+            </a:r>
+            <a:r>
+              <a:rPr lang="en-CA" dirty="0"/>
+              <a:t>methodical</a:t>
+            </a:r>
+            <a:endParaRPr lang="en-CA" sz="2800" dirty="0"/>
           </a:p>
         </p:txBody>
       </p:sp>
@@ -11827,13 +11731,8 @@
           <a:p>
             <a:r>
               <a:rPr lang="en-CA" dirty="0"/>
-              <a:t>2. </a:t>
-            </a:r>
-            <a:r>
-              <a:rPr lang="en-US" dirty="0"/>
-              <a:t>Round and round we go</a:t>
-            </a:r>
-            <a:endParaRPr lang="en-CA" dirty="0"/>
+              <a:t>2. Complex Recipe</a:t>
+            </a:r>
           </a:p>
         </p:txBody>
       </p:sp>
@@ -11853,42 +11752,137 @@
             <p:ph idx="1"/>
           </p:nvPr>
         </p:nvSpPr>
-        <p:spPr/>
+        <p:spPr>
+          <a:xfrm>
+            <a:off x="838200" y="1825625"/>
+            <a:ext cx="10515600" cy="4667250"/>
+          </a:xfrm>
+        </p:spPr>
         <p:txBody>
-          <a:bodyPr/>
+          <a:bodyPr>
+            <a:normAutofit fontScale="92500" lnSpcReduction="10000"/>
+          </a:bodyPr>
           <a:lstStyle/>
           <a:p>
+            <a:pPr marL="0" indent="0">
+              <a:buNone/>
+            </a:pPr>
             <a:r>
               <a:rPr lang="en-CA" dirty="0"/>
-              <a:t>Introduce a </a:t>
-            </a:r>
-            <a:r>
-              <a:rPr lang="en-CA" b="1" dirty="0">
+              <a:t>It’s all about the right ordering constraints for this one.</a:t>
+            </a:r>
+          </a:p>
+          <a:p>
+            <a:r>
+              <a:rPr lang="en-US" b="0" dirty="0" err="1">
                 <a:solidFill>
-                  <a:schemeClr val="accent1"/>
+                  <a:schemeClr val="accent6">
+                    <a:lumMod val="60000"/>
+                    <a:lumOff val="40000"/>
+                  </a:schemeClr>
                 </a:solidFill>
               </a:rPr>
-              <a:t>loop</a:t>
-            </a:r>
-            <a:r>
-              <a:rPr lang="en-CA" dirty="0"/>
-              <a:t> event, along with counters, so we can make sure the </a:t>
-            </a:r>
-            <a:r>
-              <a:rPr lang="en-CA" dirty="0">
+              <a:t>m_prepare</a:t>
+            </a:r>
+            <a:r>
+              <a:rPr lang="en-US" dirty="0">
                 <a:solidFill>
-                  <a:schemeClr val="accent3"/>
+                  <a:schemeClr val="accent6">
+                    <a:lumMod val="60000"/>
+                    <a:lumOff val="40000"/>
+                  </a:schemeClr>
                 </a:solidFill>
               </a:rPr>
-              <a:t>shuttles</a:t>
+              <a:t>-special-salad</a:t>
             </a:r>
             <a:r>
               <a:rPr lang="en-CA" dirty="0"/>
-              <a:t> can go round and round and …</a:t>
-            </a:r>
-          </a:p>
-          <a:p>
+              <a:t>: Prep the ingredients, concurrently with the</a:t>
+            </a:r>
+            <a:br>
+              <a:rPr lang="en-CA" dirty="0"/>
+            </a:br>
+            <a:r>
+              <a:rPr lang="en-CA" dirty="0"/>
+              <a:t>   three sequential steps of a tasty arugula fennel salad</a:t>
+            </a:r>
+          </a:p>
+          <a:p>
+            <a:r>
+              <a:rPr lang="en-US" b="0" dirty="0" err="1">
+                <a:solidFill>
+                  <a:schemeClr val="accent6">
+                    <a:lumMod val="60000"/>
+                    <a:lumOff val="40000"/>
+                  </a:schemeClr>
+                </a:solidFill>
+              </a:rPr>
+              <a:t>m_server</a:t>
+            </a:r>
+            <a:r>
+              <a:rPr lang="en-US" b="0" dirty="0">
+                <a:solidFill>
+                  <a:schemeClr val="accent6">
+                    <a:lumMod val="60000"/>
+                    <a:lumOff val="40000"/>
+                  </a:schemeClr>
+                </a:solidFill>
+              </a:rPr>
+              <a:t>-couple</a:t>
+            </a:r>
+            <a:r>
+              <a:rPr lang="en-CA" dirty="0"/>
+              <a:t>: Serve them a single special </a:t>
+            </a:r>
+            <a:r>
+              <a:rPr lang="en-CA" i="1" dirty="0"/>
+              <a:t>and</a:t>
+            </a:r>
+            <a:r>
+              <a:rPr lang="en-CA" dirty="0"/>
+              <a:t> each a meal</a:t>
+            </a:r>
+          </a:p>
+          <a:p>
+            <a:r>
+              <a:rPr lang="en-US" b="0" dirty="0">
+                <a:solidFill>
+                  <a:schemeClr val="accent6">
+                    <a:lumMod val="60000"/>
+                    <a:lumOff val="40000"/>
+                  </a:schemeClr>
+                </a:solidFill>
+              </a:rPr>
+              <a:t>m_*-course-meal</a:t>
+            </a:r>
+            <a:r>
+              <a:rPr lang="en-CA" dirty="0"/>
+              <a:t>: Only orderings should be ap + main before dessert</a:t>
+            </a:r>
+            <a:br>
+              <a:rPr lang="en-CA" dirty="0"/>
+            </a:br>
             <a:endParaRPr lang="en-CA" dirty="0"/>
+          </a:p>
+          <a:p>
+            <a:r>
+              <a:rPr lang="en-CA" dirty="0"/>
+              <a:t>Notes:</a:t>
+            </a:r>
+          </a:p>
+          <a:p>
+            <a:pPr lvl="1"/>
+            <a:r>
+              <a:rPr lang="en-CA" dirty="0"/>
+              <a:t>We’ve moved the ingredients list into hard-coded actions. Why?</a:t>
+            </a:r>
+          </a:p>
+          <a:p>
+            <a:pPr lvl="1"/>
+            <a:r>
+              <a:rPr lang="en-CA" dirty="0"/>
+              <a:t>Hard to solve 2 meals + special – comment out at least one (may need restarts)</a:t>
+            </a:r>
           </a:p>
           <a:p>
             <a:endParaRPr lang="en-CA" dirty="0"/>
@@ -11898,9 +11892,18 @@
               <a:buNone/>
             </a:pPr>
             <a:r>
+              <a:rPr lang="en-CA" sz="2800" dirty="0" err="1"/>
+              <a:t>htn</a:t>
+            </a:r>
+            <a:r>
               <a:rPr lang="en-CA" sz="2800" dirty="0"/>
-              <a:t>hybrid  /  loop</a:t>
-            </a:r>
+              <a:t>  /</a:t>
+            </a:r>
+            <a:r>
+              <a:rPr lang="en-CA" dirty="0"/>
+              <a:t>  yum</a:t>
+            </a:r>
+            <a:endParaRPr lang="en-CA" sz="2800" dirty="0"/>
           </a:p>
           <a:p>
             <a:pPr marL="0" indent="0">

</xml_diff>